<commit_message>
+ Model Reusing summary table
</commit_message>
<xml_diff>
--- a/survey.pptx
+++ b/survey.pptx
@@ -12,6 +12,11 @@
     <p:sldId id="261" r:id="rId6"/>
     <p:sldId id="263" r:id="rId7"/>
     <p:sldId id="262" r:id="rId8"/>
+    <p:sldId id="265" r:id="rId9"/>
+    <p:sldId id="266" r:id="rId10"/>
+    <p:sldId id="264" r:id="rId11"/>
+    <p:sldId id="267" r:id="rId12"/>
+    <p:sldId id="268" r:id="rId13"/>
   </p:sldIdLst>
   <p:sldSz cx="12192000" cy="6858000"/>
   <p:notesSz cx="6858000" cy="9144000"/>
@@ -128,6 +133,19 @@
             <p14:sldId id="262"/>
           </p14:sldIdLst>
         </p14:section>
+        <p14:section name="3" id="{7DD2D818-17B1-3143-A665-45B245E01BB2}">
+          <p14:sldIdLst>
+            <p14:sldId id="265"/>
+            <p14:sldId id="266"/>
+            <p14:sldId id="264"/>
+            <p14:sldId id="267"/>
+          </p14:sldIdLst>
+        </p14:section>
+        <p14:section name="4" id="{E371008E-10C8-A54E-8A42-AB024A44417F}">
+          <p14:sldIdLst>
+            <p14:sldId id="268"/>
+          </p14:sldIdLst>
+        </p14:section>
       </p14:sectionLst>
     </p:ext>
     <p:ext uri="{EFAFB233-063F-42B5-8137-9DF3F51BA10A}">
@@ -286,7 +304,7 @@
           <a:p>
             <a:fld id="{B660096C-8D26-4D32-9715-ADA6CA82D210}" type="datetimeFigureOut">
               <a:rPr lang="en-SG" smtClean="0"/>
-              <a:t>23/3/23</a:t>
+              <a:t>8/5/23</a:t>
             </a:fld>
             <a:endParaRPr lang="en-SG"/>
           </a:p>
@@ -486,7 +504,7 @@
           <a:p>
             <a:fld id="{B660096C-8D26-4D32-9715-ADA6CA82D210}" type="datetimeFigureOut">
               <a:rPr lang="en-SG" smtClean="0"/>
-              <a:t>23/3/23</a:t>
+              <a:t>8/5/23</a:t>
             </a:fld>
             <a:endParaRPr lang="en-SG"/>
           </a:p>
@@ -696,7 +714,7 @@
           <a:p>
             <a:fld id="{B660096C-8D26-4D32-9715-ADA6CA82D210}" type="datetimeFigureOut">
               <a:rPr lang="en-SG" smtClean="0"/>
-              <a:t>23/3/23</a:t>
+              <a:t>8/5/23</a:t>
             </a:fld>
             <a:endParaRPr lang="en-SG"/>
           </a:p>
@@ -896,7 +914,7 @@
           <a:p>
             <a:fld id="{B660096C-8D26-4D32-9715-ADA6CA82D210}" type="datetimeFigureOut">
               <a:rPr lang="en-SG" smtClean="0"/>
-              <a:t>23/3/23</a:t>
+              <a:t>8/5/23</a:t>
             </a:fld>
             <a:endParaRPr lang="en-SG"/>
           </a:p>
@@ -1172,7 +1190,7 @@
           <a:p>
             <a:fld id="{B660096C-8D26-4D32-9715-ADA6CA82D210}" type="datetimeFigureOut">
               <a:rPr lang="en-SG" smtClean="0"/>
-              <a:t>23/3/23</a:t>
+              <a:t>8/5/23</a:t>
             </a:fld>
             <a:endParaRPr lang="en-SG"/>
           </a:p>
@@ -1440,7 +1458,7 @@
           <a:p>
             <a:fld id="{B660096C-8D26-4D32-9715-ADA6CA82D210}" type="datetimeFigureOut">
               <a:rPr lang="en-SG" smtClean="0"/>
-              <a:t>23/3/23</a:t>
+              <a:t>8/5/23</a:t>
             </a:fld>
             <a:endParaRPr lang="en-SG"/>
           </a:p>
@@ -1855,7 +1873,7 @@
           <a:p>
             <a:fld id="{B660096C-8D26-4D32-9715-ADA6CA82D210}" type="datetimeFigureOut">
               <a:rPr lang="en-SG" smtClean="0"/>
-              <a:t>23/3/23</a:t>
+              <a:t>8/5/23</a:t>
             </a:fld>
             <a:endParaRPr lang="en-SG"/>
           </a:p>
@@ -1997,7 +2015,7 @@
           <a:p>
             <a:fld id="{B660096C-8D26-4D32-9715-ADA6CA82D210}" type="datetimeFigureOut">
               <a:rPr lang="en-SG" smtClean="0"/>
-              <a:t>23/3/23</a:t>
+              <a:t>8/5/23</a:t>
             </a:fld>
             <a:endParaRPr lang="en-SG"/>
           </a:p>
@@ -2110,7 +2128,7 @@
           <a:p>
             <a:fld id="{B660096C-8D26-4D32-9715-ADA6CA82D210}" type="datetimeFigureOut">
               <a:rPr lang="en-SG" smtClean="0"/>
-              <a:t>23/3/23</a:t>
+              <a:t>8/5/23</a:t>
             </a:fld>
             <a:endParaRPr lang="en-SG"/>
           </a:p>
@@ -2423,7 +2441,7 @@
           <a:p>
             <a:fld id="{B660096C-8D26-4D32-9715-ADA6CA82D210}" type="datetimeFigureOut">
               <a:rPr lang="en-SG" smtClean="0"/>
-              <a:t>23/3/23</a:t>
+              <a:t>8/5/23</a:t>
             </a:fld>
             <a:endParaRPr lang="en-SG"/>
           </a:p>
@@ -2712,7 +2730,7 @@
           <a:p>
             <a:fld id="{B660096C-8D26-4D32-9715-ADA6CA82D210}" type="datetimeFigureOut">
               <a:rPr lang="en-SG" smtClean="0"/>
-              <a:t>23/3/23</a:t>
+              <a:t>8/5/23</a:t>
             </a:fld>
             <a:endParaRPr lang="en-SG"/>
           </a:p>
@@ -2955,7 +2973,7 @@
           <a:p>
             <a:fld id="{B660096C-8D26-4D32-9715-ADA6CA82D210}" type="datetimeFigureOut">
               <a:rPr lang="en-SG" smtClean="0"/>
-              <a:t>23/3/23</a:t>
+              <a:t>8/5/23</a:t>
             </a:fld>
             <a:endParaRPr lang="en-SG"/>
           </a:p>
@@ -3629,6 +3647,246 @@
 </p:sld>
 </file>
 
+<file path=ppt/slides/slide10.xml><?xml version="1.0" encoding="utf-8"?>
+<p:sld xmlns:a="http://schemas.openxmlformats.org/drawingml/2006/main" xmlns:r="http://schemas.openxmlformats.org/officeDocument/2006/relationships" xmlns:p="http://schemas.openxmlformats.org/presentationml/2006/main">
+  <p:cSld>
+    <p:spTree>
+      <p:nvGrpSpPr>
+        <p:cNvPr id="1" name=""/>
+        <p:cNvGrpSpPr/>
+        <p:nvPr/>
+      </p:nvGrpSpPr>
+      <p:grpSpPr>
+        <a:xfrm>
+          <a:off x="0" y="0"/>
+          <a:ext cx="0" cy="0"/>
+          <a:chOff x="0" y="0"/>
+          <a:chExt cx="0" cy="0"/>
+        </a:xfrm>
+      </p:grpSpPr>
+      <p:pic>
+        <p:nvPicPr>
+          <p:cNvPr id="4" name="Picture 3">
+            <a:extLst>
+              <a:ext uri="{FF2B5EF4-FFF2-40B4-BE49-F238E27FC236}">
+                <a16:creationId xmlns:a16="http://schemas.microsoft.com/office/drawing/2014/main" id="{1C1F868C-B8BC-BBE6-0FE2-56FAC64E5426}"/>
+              </a:ext>
+            </a:extLst>
+          </p:cNvPr>
+          <p:cNvPicPr>
+            <a:picLocks noChangeAspect="1"/>
+          </p:cNvPicPr>
+          <p:nvPr/>
+        </p:nvPicPr>
+        <p:blipFill>
+          <a:blip r:embed="rId2"/>
+          <a:stretch>
+            <a:fillRect/>
+          </a:stretch>
+        </p:blipFill>
+        <p:spPr>
+          <a:xfrm>
+            <a:off x="5808616" y="1797031"/>
+            <a:ext cx="6192854" cy="3121307"/>
+          </a:xfrm>
+          <a:prstGeom prst="rect">
+            <a:avLst/>
+          </a:prstGeom>
+        </p:spPr>
+      </p:pic>
+      <p:pic>
+        <p:nvPicPr>
+          <p:cNvPr id="6" name="Picture 5">
+            <a:extLst>
+              <a:ext uri="{FF2B5EF4-FFF2-40B4-BE49-F238E27FC236}">
+                <a16:creationId xmlns:a16="http://schemas.microsoft.com/office/drawing/2014/main" id="{8738D496-2EA9-DC85-622D-315F8E874A94}"/>
+              </a:ext>
+            </a:extLst>
+          </p:cNvPr>
+          <p:cNvPicPr>
+            <a:picLocks noChangeAspect="1"/>
+          </p:cNvPicPr>
+          <p:nvPr/>
+        </p:nvPicPr>
+        <p:blipFill>
+          <a:blip r:embed="rId3"/>
+          <a:stretch>
+            <a:fillRect/>
+          </a:stretch>
+        </p:blipFill>
+        <p:spPr>
+          <a:xfrm>
+            <a:off x="348341" y="1463685"/>
+            <a:ext cx="5327469" cy="3788001"/>
+          </a:xfrm>
+          <a:prstGeom prst="rect">
+            <a:avLst/>
+          </a:prstGeom>
+        </p:spPr>
+      </p:pic>
+    </p:spTree>
+    <p:extLst>
+      <p:ext uri="{BB962C8B-B14F-4D97-AF65-F5344CB8AC3E}">
+        <p14:creationId xmlns:p14="http://schemas.microsoft.com/office/powerpoint/2010/main" val="1869928445"/>
+      </p:ext>
+    </p:extLst>
+  </p:cSld>
+  <p:clrMapOvr>
+    <a:masterClrMapping/>
+  </p:clrMapOvr>
+</p:sld>
+</file>
+
+<file path=ppt/slides/slide11.xml><?xml version="1.0" encoding="utf-8"?>
+<p:sld xmlns:a="http://schemas.openxmlformats.org/drawingml/2006/main" xmlns:r="http://schemas.openxmlformats.org/officeDocument/2006/relationships" xmlns:p="http://schemas.openxmlformats.org/presentationml/2006/main">
+  <p:cSld>
+    <p:spTree>
+      <p:nvGrpSpPr>
+        <p:cNvPr id="1" name=""/>
+        <p:cNvGrpSpPr/>
+        <p:nvPr/>
+      </p:nvGrpSpPr>
+      <p:grpSpPr>
+        <a:xfrm>
+          <a:off x="0" y="0"/>
+          <a:ext cx="0" cy="0"/>
+          <a:chOff x="0" y="0"/>
+          <a:chExt cx="0" cy="0"/>
+        </a:xfrm>
+      </p:grpSpPr>
+      <p:pic>
+        <p:nvPicPr>
+          <p:cNvPr id="4" name="Picture 3">
+            <a:extLst>
+              <a:ext uri="{FF2B5EF4-FFF2-40B4-BE49-F238E27FC236}">
+                <a16:creationId xmlns:a16="http://schemas.microsoft.com/office/drawing/2014/main" id="{31517E60-93E2-B8D7-BE39-242E9555C8AC}"/>
+              </a:ext>
+            </a:extLst>
+          </p:cNvPr>
+          <p:cNvPicPr>
+            <a:picLocks noChangeAspect="1"/>
+          </p:cNvPicPr>
+          <p:nvPr/>
+        </p:nvPicPr>
+        <p:blipFill>
+          <a:blip r:embed="rId2"/>
+          <a:stretch>
+            <a:fillRect/>
+          </a:stretch>
+        </p:blipFill>
+        <p:spPr>
+          <a:xfrm>
+            <a:off x="2209800" y="3117803"/>
+            <a:ext cx="7772400" cy="2660196"/>
+          </a:xfrm>
+          <a:prstGeom prst="rect">
+            <a:avLst/>
+          </a:prstGeom>
+        </p:spPr>
+      </p:pic>
+      <p:pic>
+        <p:nvPicPr>
+          <p:cNvPr id="5" name="Picture 4">
+            <a:extLst>
+              <a:ext uri="{FF2B5EF4-FFF2-40B4-BE49-F238E27FC236}">
+                <a16:creationId xmlns:a16="http://schemas.microsoft.com/office/drawing/2014/main" id="{9C1AB911-26CD-1140-2585-EAC3FED005EB}"/>
+              </a:ext>
+            </a:extLst>
+          </p:cNvPr>
+          <p:cNvPicPr>
+            <a:picLocks noChangeAspect="1"/>
+          </p:cNvPicPr>
+          <p:nvPr/>
+        </p:nvPicPr>
+        <p:blipFill>
+          <a:blip r:embed="rId3"/>
+          <a:stretch>
+            <a:fillRect/>
+          </a:stretch>
+        </p:blipFill>
+        <p:spPr>
+          <a:xfrm>
+            <a:off x="2209800" y="735112"/>
+            <a:ext cx="7772400" cy="2148185"/>
+          </a:xfrm>
+          <a:prstGeom prst="rect">
+            <a:avLst/>
+          </a:prstGeom>
+        </p:spPr>
+      </p:pic>
+    </p:spTree>
+    <p:extLst>
+      <p:ext uri="{BB962C8B-B14F-4D97-AF65-F5344CB8AC3E}">
+        <p14:creationId xmlns:p14="http://schemas.microsoft.com/office/powerpoint/2010/main" val="547406477"/>
+      </p:ext>
+    </p:extLst>
+  </p:cSld>
+  <p:clrMapOvr>
+    <a:masterClrMapping/>
+  </p:clrMapOvr>
+</p:sld>
+</file>
+
+<file path=ppt/slides/slide12.xml><?xml version="1.0" encoding="utf-8"?>
+<p:sld xmlns:a="http://schemas.openxmlformats.org/drawingml/2006/main" xmlns:r="http://schemas.openxmlformats.org/officeDocument/2006/relationships" xmlns:p="http://schemas.openxmlformats.org/presentationml/2006/main">
+  <p:cSld>
+    <p:spTree>
+      <p:nvGrpSpPr>
+        <p:cNvPr id="1" name=""/>
+        <p:cNvGrpSpPr/>
+        <p:nvPr/>
+      </p:nvGrpSpPr>
+      <p:grpSpPr>
+        <a:xfrm>
+          <a:off x="0" y="0"/>
+          <a:ext cx="0" cy="0"/>
+          <a:chOff x="0" y="0"/>
+          <a:chExt cx="0" cy="0"/>
+        </a:xfrm>
+      </p:grpSpPr>
+      <p:pic>
+        <p:nvPicPr>
+          <p:cNvPr id="4" name="Picture 3">
+            <a:extLst>
+              <a:ext uri="{FF2B5EF4-FFF2-40B4-BE49-F238E27FC236}">
+                <a16:creationId xmlns:a16="http://schemas.microsoft.com/office/drawing/2014/main" id="{AC1CF374-C3B4-9A53-F3BC-87F6D8E73048}"/>
+              </a:ext>
+            </a:extLst>
+          </p:cNvPr>
+          <p:cNvPicPr>
+            <a:picLocks noChangeAspect="1"/>
+          </p:cNvPicPr>
+          <p:nvPr/>
+        </p:nvPicPr>
+        <p:blipFill>
+          <a:blip r:embed="rId2"/>
+          <a:stretch>
+            <a:fillRect/>
+          </a:stretch>
+        </p:blipFill>
+        <p:spPr>
+          <a:xfrm>
+            <a:off x="2209800" y="1015769"/>
+            <a:ext cx="7772400" cy="4826461"/>
+          </a:xfrm>
+          <a:prstGeom prst="rect">
+            <a:avLst/>
+          </a:prstGeom>
+        </p:spPr>
+      </p:pic>
+    </p:spTree>
+    <p:extLst>
+      <p:ext uri="{BB962C8B-B14F-4D97-AF65-F5344CB8AC3E}">
+        <p14:creationId xmlns:p14="http://schemas.microsoft.com/office/powerpoint/2010/main" val="2406558100"/>
+      </p:ext>
+    </p:extLst>
+  </p:cSld>
+  <p:clrMapOvr>
+    <a:masterClrMapping/>
+  </p:clrMapOvr>
+</p:sld>
+</file>
+
 <file path=ppt/slides/slide2.xml><?xml version="1.0" encoding="utf-8"?>
 <p:sld xmlns:a="http://schemas.openxmlformats.org/drawingml/2006/main" xmlns:r="http://schemas.openxmlformats.org/officeDocument/2006/relationships" xmlns:p="http://schemas.openxmlformats.org/presentationml/2006/main">
   <p:cSld>
@@ -4191,6 +4449,624 @@
     <p:extLst>
       <p:ext uri="{BB962C8B-B14F-4D97-AF65-F5344CB8AC3E}">
         <p14:creationId xmlns:p14="http://schemas.microsoft.com/office/powerpoint/2010/main" val="1337193690"/>
+      </p:ext>
+    </p:extLst>
+  </p:cSld>
+  <p:clrMapOvr>
+    <a:masterClrMapping/>
+  </p:clrMapOvr>
+</p:sld>
+</file>
+
+<file path=ppt/slides/slide8.xml><?xml version="1.0" encoding="utf-8"?>
+<p:sld xmlns:a="http://schemas.openxmlformats.org/drawingml/2006/main" xmlns:r="http://schemas.openxmlformats.org/officeDocument/2006/relationships" xmlns:p="http://schemas.openxmlformats.org/presentationml/2006/main">
+  <p:cSld>
+    <p:spTree>
+      <p:nvGrpSpPr>
+        <p:cNvPr id="1" name=""/>
+        <p:cNvGrpSpPr/>
+        <p:nvPr/>
+      </p:nvGrpSpPr>
+      <p:grpSpPr>
+        <a:xfrm>
+          <a:off x="0" y="0"/>
+          <a:ext cx="0" cy="0"/>
+          <a:chOff x="0" y="0"/>
+          <a:chExt cx="0" cy="0"/>
+        </a:xfrm>
+      </p:grpSpPr>
+      <p:sp>
+        <p:nvSpPr>
+          <p:cNvPr id="5" name="TextBox 4">
+            <a:extLst>
+              <a:ext uri="{FF2B5EF4-FFF2-40B4-BE49-F238E27FC236}">
+                <a16:creationId xmlns:a16="http://schemas.microsoft.com/office/drawing/2014/main" id="{C6E1D401-2566-8867-ED8B-61E2AB3E1BCA}"/>
+              </a:ext>
+            </a:extLst>
+          </p:cNvPr>
+          <p:cNvSpPr txBox="1"/>
+          <p:nvPr/>
+        </p:nvSpPr>
+        <p:spPr>
+          <a:xfrm>
+            <a:off x="1033326" y="1053220"/>
+            <a:ext cx="9985194" cy="4619854"/>
+          </a:xfrm>
+          <a:prstGeom prst="rect">
+            <a:avLst/>
+          </a:prstGeom>
+          <a:noFill/>
+        </p:spPr>
+        <p:txBody>
+          <a:bodyPr wrap="square">
+            <a:spAutoFit/>
+          </a:bodyPr>
+          <a:lstStyle/>
+          <a:p>
+            <a:pPr>
+              <a:lnSpc>
+                <a:spcPct val="150000"/>
+              </a:lnSpc>
+              <a:buFont typeface="+mj-lt"/>
+              <a:buAutoNum type="arabicPeriod"/>
+            </a:pPr>
+            <a:r>
+              <a:rPr lang="en-SG" sz="1800" dirty="0">
+                <a:effectLst/>
+                <a:latin typeface="LinLibertineTB"/>
+              </a:rPr>
+              <a:t>  Preferences for Datasets or Databases</a:t>
+            </a:r>
+            <a:r>
+              <a:rPr lang="en-SG" sz="1800" dirty="0">
+                <a:effectLst/>
+                <a:latin typeface="LinLibertineT"/>
+              </a:rPr>
+              <a:t>: CC0-1.0, ODC-By &gt; CC BY &gt; C-UDA &gt; LGPL-LR. </a:t>
+            </a:r>
+          </a:p>
+          <a:p>
+            <a:pPr>
+              <a:lnSpc>
+                <a:spcPct val="150000"/>
+              </a:lnSpc>
+              <a:buFont typeface="+mj-lt"/>
+              <a:buAutoNum type="arabicPeriod"/>
+            </a:pPr>
+            <a:r>
+              <a:rPr lang="en-SG" sz="1800" dirty="0">
+                <a:effectLst/>
+                <a:latin typeface="LinLibertineTB"/>
+              </a:rPr>
+              <a:t>  Preferences for Software</a:t>
+            </a:r>
+            <a:r>
+              <a:rPr lang="en-SG" sz="1800" dirty="0">
+                <a:effectLst/>
+                <a:latin typeface="LinLibertineT"/>
+              </a:rPr>
+              <a:t>: Apache-2.0, AFL-3.0, Artistic-2.0, ECL-2.0 &gt; MIT, BSD-3-Clause&amp;-Clear, BSL-1.0, BSD-2-Clause, NCSA </a:t>
+            </a:r>
+            <a:r>
+              <a:rPr lang="en-SG" sz="1800" dirty="0">
+                <a:effectLst/>
+                <a:latin typeface="txsys"/>
+              </a:rPr>
+              <a:t>≈ </a:t>
+            </a:r>
+            <a:r>
+              <a:rPr lang="en-SG" sz="1800" dirty="0">
+                <a:effectLst/>
+                <a:latin typeface="LinLibertineT"/>
+              </a:rPr>
+              <a:t>Ms-PL &gt; WTFPL-2.0, </a:t>
+            </a:r>
+            <a:r>
+              <a:rPr lang="en-SG" sz="1800" dirty="0" err="1">
+                <a:effectLst/>
+                <a:latin typeface="LinLibertineT"/>
+              </a:rPr>
+              <a:t>Unlicense</a:t>
+            </a:r>
+            <a:r>
+              <a:rPr lang="en-SG" sz="1800" dirty="0">
+                <a:effectLst/>
+                <a:latin typeface="LinLibertineT"/>
+              </a:rPr>
+              <a:t>, ISC, </a:t>
+            </a:r>
+            <a:r>
+              <a:rPr lang="en-SG" sz="1800" dirty="0" err="1">
+                <a:effectLst/>
+                <a:latin typeface="LinLibertineT"/>
+              </a:rPr>
+              <a:t>Zlib</a:t>
+            </a:r>
+            <a:r>
+              <a:rPr lang="en-SG" sz="1800" dirty="0">
+                <a:effectLst/>
+                <a:latin typeface="LinLibertineT"/>
+              </a:rPr>
+              <a:t>, PostgreSQL. </a:t>
+            </a:r>
+            <a:endParaRPr lang="en-SG" dirty="0"/>
+          </a:p>
+          <a:p>
+            <a:pPr>
+              <a:lnSpc>
+                <a:spcPct val="150000"/>
+              </a:lnSpc>
+              <a:buFont typeface="+mj-lt"/>
+              <a:buAutoNum type="arabicPeriod"/>
+            </a:pPr>
+            <a:r>
+              <a:rPr lang="en-SG" sz="1800" dirty="0">
+                <a:effectLst/>
+                <a:latin typeface="LinLibertineTB"/>
+              </a:rPr>
+              <a:t>  Preferences for Models</a:t>
+            </a:r>
+            <a:r>
+              <a:rPr lang="en-SG" sz="1800" dirty="0">
+                <a:effectLst/>
+                <a:latin typeface="LinLibertineT"/>
+              </a:rPr>
+              <a:t>: Apache-2.0, AFL-3.0, Artistic-2.0, ECL-2.0 &gt; </a:t>
+            </a:r>
+            <a:r>
+              <a:rPr lang="en-SG" sz="1800" dirty="0" err="1">
+                <a:effectLst/>
+                <a:latin typeface="LinLibertineT"/>
+              </a:rPr>
+              <a:t>OpenRAIL</a:t>
+            </a:r>
+            <a:r>
+              <a:rPr lang="en-SG" sz="1800" dirty="0">
+                <a:effectLst/>
+                <a:latin typeface="LinLibertineT"/>
+              </a:rPr>
+              <a:t> and its derivatives </a:t>
+            </a:r>
+            <a:endParaRPr lang="en-SG" dirty="0"/>
+          </a:p>
+          <a:p>
+            <a:pPr>
+              <a:lnSpc>
+                <a:spcPct val="150000"/>
+              </a:lnSpc>
+            </a:pPr>
+            <a:endParaRPr lang="en-SG" sz="1800" dirty="0">
+              <a:effectLst/>
+              <a:latin typeface="LinLibertineTI"/>
+            </a:endParaRPr>
+          </a:p>
+          <a:p>
+            <a:pPr>
+              <a:lnSpc>
+                <a:spcPct val="150000"/>
+              </a:lnSpc>
+            </a:pPr>
+            <a:r>
+              <a:rPr lang="en-SG" sz="1800" dirty="0" err="1">
+                <a:effectLst/>
+                <a:latin typeface="LinLibertineT"/>
+              </a:rPr>
+              <a:t>CreativeML</a:t>
+            </a:r>
+            <a:r>
+              <a:rPr lang="en-SG" dirty="0">
+                <a:latin typeface="LinLibertineT"/>
+              </a:rPr>
+              <a:t> </a:t>
+            </a:r>
+            <a:r>
+              <a:rPr lang="en-SG" sz="1800" dirty="0" err="1">
+                <a:effectLst/>
+                <a:latin typeface="LinLibertineT"/>
+              </a:rPr>
+              <a:t>OpenRAIL</a:t>
+            </a:r>
+            <a:r>
+              <a:rPr lang="en-SG" sz="1800" dirty="0">
+                <a:effectLst/>
+                <a:latin typeface="LinLibertineT"/>
+              </a:rPr>
+              <a:t>-M</a:t>
+            </a:r>
+            <a:r>
+              <a:rPr lang="en-SG" dirty="0">
+                <a:latin typeface="LinLibertineTI"/>
+              </a:rPr>
+              <a:t>:</a:t>
+            </a:r>
+            <a:endParaRPr lang="en-SG" sz="1800" dirty="0">
+              <a:effectLst/>
+              <a:latin typeface="LinLibertineTI"/>
+            </a:endParaRPr>
+          </a:p>
+          <a:p>
+            <a:pPr>
+              <a:lnSpc>
+                <a:spcPct val="150000"/>
+              </a:lnSpc>
+            </a:pPr>
+            <a:r>
+              <a:rPr lang="en-SG" sz="1800" i="1" dirty="0">
+                <a:effectLst/>
+                <a:latin typeface="LinLibertineTI"/>
+              </a:rPr>
+              <a:t>	Therefore You cannot use the Model and the Derivatives of the Model for the specified restricted uses ... </a:t>
+            </a:r>
+            <a:r>
+              <a:rPr lang="en-SG" i="1" dirty="0">
+                <a:latin typeface="LinLibertineTI"/>
+              </a:rPr>
+              <a:t>You shall require all of Your users who use the Model or a Derivative of the Model to comply with the terms of this paragraph. </a:t>
+            </a:r>
+          </a:p>
+          <a:p>
+            <a:pPr>
+              <a:lnSpc>
+                <a:spcPct val="150000"/>
+              </a:lnSpc>
+            </a:pPr>
+            <a:r>
+              <a:rPr lang="en-SG" i="1" dirty="0">
+                <a:latin typeface="LinLibertineTI"/>
+              </a:rPr>
+              <a:t>	You shall undertake reasonable efforts to use the latest version of the Model </a:t>
+            </a:r>
+          </a:p>
+          <a:p>
+            <a:pPr>
+              <a:lnSpc>
+                <a:spcPct val="150000"/>
+              </a:lnSpc>
+            </a:pPr>
+            <a:endParaRPr lang="en-SG" dirty="0">
+              <a:effectLst/>
+            </a:endParaRPr>
+          </a:p>
+        </p:txBody>
+      </p:sp>
+    </p:spTree>
+    <p:extLst>
+      <p:ext uri="{BB962C8B-B14F-4D97-AF65-F5344CB8AC3E}">
+        <p14:creationId xmlns:p14="http://schemas.microsoft.com/office/powerpoint/2010/main" val="935814334"/>
+      </p:ext>
+    </p:extLst>
+  </p:cSld>
+  <p:clrMapOvr>
+    <a:masterClrMapping/>
+  </p:clrMapOvr>
+</p:sld>
+</file>
+
+<file path=ppt/slides/slide9.xml><?xml version="1.0" encoding="utf-8"?>
+<p:sld xmlns:a="http://schemas.openxmlformats.org/drawingml/2006/main" xmlns:r="http://schemas.openxmlformats.org/officeDocument/2006/relationships" xmlns:p="http://schemas.openxmlformats.org/presentationml/2006/main">
+  <p:cSld>
+    <p:spTree>
+      <p:nvGrpSpPr>
+        <p:cNvPr id="1" name=""/>
+        <p:cNvGrpSpPr/>
+        <p:nvPr/>
+      </p:nvGrpSpPr>
+      <p:grpSpPr>
+        <a:xfrm>
+          <a:off x="0" y="0"/>
+          <a:ext cx="0" cy="0"/>
+          <a:chOff x="0" y="0"/>
+          <a:chExt cx="0" cy="0"/>
+        </a:xfrm>
+      </p:grpSpPr>
+      <p:sp>
+        <p:nvSpPr>
+          <p:cNvPr id="4" name="TextBox 3">
+            <a:extLst>
+              <a:ext uri="{FF2B5EF4-FFF2-40B4-BE49-F238E27FC236}">
+                <a16:creationId xmlns:a16="http://schemas.microsoft.com/office/drawing/2014/main" id="{629810F0-2A32-0904-C1E8-186D453E117E}"/>
+              </a:ext>
+            </a:extLst>
+          </p:cNvPr>
+          <p:cNvSpPr txBox="1"/>
+          <p:nvPr/>
+        </p:nvSpPr>
+        <p:spPr>
+          <a:xfrm>
+            <a:off x="1033326" y="1303596"/>
+            <a:ext cx="10125348" cy="4619854"/>
+          </a:xfrm>
+          <a:prstGeom prst="rect">
+            <a:avLst/>
+          </a:prstGeom>
+          <a:noFill/>
+        </p:spPr>
+        <p:txBody>
+          <a:bodyPr wrap="square">
+            <a:spAutoFit/>
+          </a:bodyPr>
+          <a:lstStyle/>
+          <a:p>
+            <a:pPr>
+              <a:lnSpc>
+                <a:spcPct val="150000"/>
+              </a:lnSpc>
+            </a:pPr>
+            <a:r>
+              <a:rPr lang="en-SG" sz="1800" b="1" dirty="0">
+                <a:effectLst/>
+                <a:latin typeface="LinLibertineT"/>
+              </a:rPr>
+              <a:t>Copyrightable</a:t>
+            </a:r>
+            <a:r>
+              <a:rPr lang="en-US" sz="1800" dirty="0">
+                <a:effectLst/>
+                <a:latin typeface="LinLibertineT"/>
+              </a:rPr>
+              <a:t> 🤔</a:t>
+            </a:r>
+            <a:endParaRPr lang="en-US" altLang="zh-CN" sz="1800" dirty="0">
+              <a:effectLst/>
+              <a:latin typeface="LinLibertineT"/>
+            </a:endParaRPr>
+          </a:p>
+          <a:p>
+            <a:pPr>
+              <a:lnSpc>
+                <a:spcPct val="150000"/>
+              </a:lnSpc>
+            </a:pPr>
+            <a:r>
+              <a:rPr lang="en-US" i="1" dirty="0">
+                <a:latin typeface="LinLibertineTI"/>
+              </a:rPr>
+              <a:t>	</a:t>
+            </a:r>
+            <a:r>
+              <a:rPr lang="en-US" altLang="zh-CN" i="1" dirty="0">
+                <a:latin typeface="LinLibertineTI"/>
+              </a:rPr>
+              <a:t>L</a:t>
+            </a:r>
+            <a:r>
+              <a:rPr lang="en-SG" i="1" dirty="0" err="1">
+                <a:latin typeface="LinLibertineTI"/>
+              </a:rPr>
+              <a:t>evel</a:t>
+            </a:r>
+            <a:r>
+              <a:rPr lang="en-SG" i="1" dirty="0">
+                <a:latin typeface="LinLibertineTI"/>
+              </a:rPr>
+              <a:t> of creativity and originality</a:t>
+            </a:r>
+            <a:r>
+              <a:rPr lang="en-US" altLang="zh-CN" i="1" dirty="0">
+                <a:latin typeface="LinLibertineTI"/>
+              </a:rPr>
+              <a:t>.</a:t>
+            </a:r>
+            <a:endParaRPr lang="en-US" i="1" dirty="0">
+              <a:latin typeface="LinLibertineTI"/>
+            </a:endParaRPr>
+          </a:p>
+          <a:p>
+            <a:pPr>
+              <a:lnSpc>
+                <a:spcPct val="150000"/>
+              </a:lnSpc>
+            </a:pPr>
+            <a:r>
+              <a:rPr lang="en-US" i="1" dirty="0">
+                <a:latin typeface="LinLibertineTI"/>
+              </a:rPr>
+              <a:t>	</a:t>
+            </a:r>
+            <a:r>
+              <a:rPr lang="en-US" altLang="zh-CN" i="1" dirty="0">
+                <a:latin typeface="LinLibertineTI"/>
+              </a:rPr>
+              <a:t>P</a:t>
+            </a:r>
+            <a:r>
+              <a:rPr lang="en-SG" i="1" dirty="0" err="1">
+                <a:latin typeface="LinLibertineTI"/>
+              </a:rPr>
+              <a:t>resence</a:t>
+            </a:r>
+            <a:r>
+              <a:rPr lang="en-SG" i="1" dirty="0">
+                <a:latin typeface="LinLibertineTI"/>
+              </a:rPr>
+              <a:t> of at least minimal human creative effort at the time the work is produced</a:t>
+            </a:r>
+            <a:r>
+              <a:rPr lang="en-US" altLang="zh-CN" i="1" dirty="0">
+                <a:latin typeface="LinLibertineTI"/>
+              </a:rPr>
+              <a:t>.</a:t>
+            </a:r>
+          </a:p>
+          <a:p>
+            <a:pPr>
+              <a:lnSpc>
+                <a:spcPct val="150000"/>
+              </a:lnSpc>
+            </a:pPr>
+            <a:r>
+              <a:rPr lang="en-US" sz="1800" i="1" dirty="0">
+                <a:effectLst/>
+                <a:latin typeface="LinLibertineTI"/>
+              </a:rPr>
+              <a:t>	Authorship -&gt; </a:t>
+            </a:r>
+            <a:r>
+              <a:rPr lang="en-SG" i="1" dirty="0">
+                <a:latin typeface="LinLibertineTI"/>
+              </a:rPr>
+              <a:t>O</a:t>
+            </a:r>
+            <a:r>
+              <a:rPr lang="en-SG" sz="1800" dirty="0">
+                <a:effectLst/>
+                <a:latin typeface="LinLibertineTI"/>
+              </a:rPr>
+              <a:t>riginal intellectual conceptions.</a:t>
+            </a:r>
+            <a:endParaRPr lang="en-SG" sz="1800" dirty="0">
+              <a:effectLst/>
+              <a:latin typeface="LinLibertineT"/>
+            </a:endParaRPr>
+          </a:p>
+          <a:p>
+            <a:pPr>
+              <a:lnSpc>
+                <a:spcPct val="150000"/>
+              </a:lnSpc>
+            </a:pPr>
+            <a:endParaRPr lang="en-SG" sz="1800" dirty="0">
+              <a:effectLst/>
+              <a:latin typeface="LinLibertineT"/>
+            </a:endParaRPr>
+          </a:p>
+          <a:p>
+            <a:pPr>
+              <a:lnSpc>
+                <a:spcPct val="150000"/>
+              </a:lnSpc>
+            </a:pPr>
+            <a:r>
+              <a:rPr lang="en-SG" sz="1800" dirty="0">
+                <a:effectLst/>
+                <a:latin typeface="LinLibertineT"/>
+              </a:rPr>
+              <a:t>Stable Diffusion License: </a:t>
+            </a:r>
+          </a:p>
+          <a:p>
+            <a:pPr>
+              <a:lnSpc>
+                <a:spcPct val="150000"/>
+              </a:lnSpc>
+            </a:pPr>
+            <a:r>
+              <a:rPr lang="en-SG" i="1" dirty="0">
+                <a:latin typeface="LinLibertineT"/>
+              </a:rPr>
+              <a:t>	</a:t>
+            </a:r>
+            <a:r>
+              <a:rPr lang="en-SG" sz="1800" i="1" dirty="0">
+                <a:effectLst/>
+                <a:latin typeface="LinLibertineTI"/>
+              </a:rPr>
+              <a:t>Licensor claims no rights in the Output You generate using the Model</a:t>
+            </a:r>
+            <a:r>
+              <a:rPr lang="en-SG" sz="1800" i="1" dirty="0">
+                <a:effectLst/>
+                <a:latin typeface="LinLibertineT"/>
+              </a:rPr>
+              <a:t>. </a:t>
+            </a:r>
+          </a:p>
+          <a:p>
+            <a:pPr>
+              <a:lnSpc>
+                <a:spcPct val="150000"/>
+              </a:lnSpc>
+            </a:pPr>
+            <a:endParaRPr lang="en-SG" i="1" dirty="0"/>
+          </a:p>
+          <a:p>
+            <a:pPr>
+              <a:lnSpc>
+                <a:spcPct val="150000"/>
+              </a:lnSpc>
+            </a:pPr>
+            <a:r>
+              <a:rPr lang="en-SG" sz="1800" dirty="0" err="1">
+                <a:effectLst/>
+                <a:latin typeface="LinLibertineT"/>
+              </a:rPr>
+              <a:t>OpenAI</a:t>
+            </a:r>
+            <a:r>
+              <a:rPr lang="en-SG" sz="1800" dirty="0">
+                <a:effectLst/>
+                <a:latin typeface="LinLibertineT"/>
+              </a:rPr>
+              <a:t> </a:t>
+            </a:r>
+            <a:r>
+              <a:rPr lang="en-SG" sz="1800" dirty="0" err="1">
+                <a:effectLst/>
+                <a:latin typeface="LinLibertineT"/>
+              </a:rPr>
+              <a:t>Sharing&amp;Publication</a:t>
+            </a:r>
+            <a:r>
+              <a:rPr lang="en-SG" sz="1800" dirty="0">
+                <a:effectLst/>
+                <a:latin typeface="LinLibertineT"/>
+              </a:rPr>
+              <a:t> Policy</a:t>
+            </a:r>
+            <a:r>
+              <a:rPr lang="en-SG" dirty="0">
+                <a:latin typeface="LinLibertineT"/>
+              </a:rPr>
+              <a:t>: </a:t>
+            </a:r>
+          </a:p>
+          <a:p>
+            <a:pPr>
+              <a:lnSpc>
+                <a:spcPct val="150000"/>
+              </a:lnSpc>
+            </a:pPr>
+            <a:r>
+              <a:rPr lang="en-SG" sz="1800" i="1" dirty="0">
+                <a:effectLst/>
+                <a:latin typeface="LinLibertineT"/>
+              </a:rPr>
+              <a:t>	</a:t>
+            </a:r>
+            <a:r>
+              <a:rPr lang="en-SG" sz="1800" i="1" dirty="0">
+                <a:effectLst/>
+                <a:latin typeface="LinLibertineTI"/>
+              </a:rPr>
+              <a:t>The published content is attributed to your name or company</a:t>
+            </a:r>
+            <a:r>
+              <a:rPr lang="en-SG" sz="1800" i="1" dirty="0">
+                <a:effectLst/>
+                <a:latin typeface="LinLibertineT"/>
+              </a:rPr>
+              <a:t>. </a:t>
+            </a:r>
+            <a:endParaRPr lang="en-SG" i="1" dirty="0"/>
+          </a:p>
+          <a:p>
+            <a:pPr>
+              <a:lnSpc>
+                <a:spcPct val="150000"/>
+              </a:lnSpc>
+              <a:buFont typeface="+mj-lt"/>
+              <a:buAutoNum type="arabicPeriod"/>
+            </a:pPr>
+            <a:endParaRPr lang="en-SG" b="1" dirty="0">
+              <a:effectLst/>
+            </a:endParaRPr>
+          </a:p>
+        </p:txBody>
+      </p:sp>
+    </p:spTree>
+    <p:extLst>
+      <p:ext uri="{BB962C8B-B14F-4D97-AF65-F5344CB8AC3E}">
+        <p14:creationId xmlns:p14="http://schemas.microsoft.com/office/powerpoint/2010/main" val="2177848299"/>
       </p:ext>
     </p:extLst>
   </p:cSld>

</xml_diff>

<commit_message>
+ Working Table 4
</commit_message>
<xml_diff>
--- a/survey.pptx
+++ b/survey.pptx
@@ -17,6 +17,7 @@
     <p:sldId id="264" r:id="rId11"/>
     <p:sldId id="267" r:id="rId12"/>
     <p:sldId id="268" r:id="rId13"/>
+    <p:sldId id="269" r:id="rId14"/>
   </p:sldIdLst>
   <p:sldSz cx="12192000" cy="6858000"/>
   <p:notesSz cx="6858000" cy="9144000"/>
@@ -144,6 +145,7 @@
         <p14:section name="4" id="{E371008E-10C8-A54E-8A42-AB024A44417F}">
           <p14:sldIdLst>
             <p14:sldId id="268"/>
+            <p14:sldId id="269"/>
           </p14:sldIdLst>
         </p14:section>
       </p14:sectionLst>
@@ -304,7 +306,7 @@
           <a:p>
             <a:fld id="{B660096C-8D26-4D32-9715-ADA6CA82D210}" type="datetimeFigureOut">
               <a:rPr lang="en-SG" smtClean="0"/>
-              <a:t>8/5/23</a:t>
+              <a:t>15/5/23</a:t>
             </a:fld>
             <a:endParaRPr lang="en-SG"/>
           </a:p>
@@ -504,7 +506,7 @@
           <a:p>
             <a:fld id="{B660096C-8D26-4D32-9715-ADA6CA82D210}" type="datetimeFigureOut">
               <a:rPr lang="en-SG" smtClean="0"/>
-              <a:t>8/5/23</a:t>
+              <a:t>15/5/23</a:t>
             </a:fld>
             <a:endParaRPr lang="en-SG"/>
           </a:p>
@@ -714,7 +716,7 @@
           <a:p>
             <a:fld id="{B660096C-8D26-4D32-9715-ADA6CA82D210}" type="datetimeFigureOut">
               <a:rPr lang="en-SG" smtClean="0"/>
-              <a:t>8/5/23</a:t>
+              <a:t>15/5/23</a:t>
             </a:fld>
             <a:endParaRPr lang="en-SG"/>
           </a:p>
@@ -914,7 +916,7 @@
           <a:p>
             <a:fld id="{B660096C-8D26-4D32-9715-ADA6CA82D210}" type="datetimeFigureOut">
               <a:rPr lang="en-SG" smtClean="0"/>
-              <a:t>8/5/23</a:t>
+              <a:t>15/5/23</a:t>
             </a:fld>
             <a:endParaRPr lang="en-SG"/>
           </a:p>
@@ -1190,7 +1192,7 @@
           <a:p>
             <a:fld id="{B660096C-8D26-4D32-9715-ADA6CA82D210}" type="datetimeFigureOut">
               <a:rPr lang="en-SG" smtClean="0"/>
-              <a:t>8/5/23</a:t>
+              <a:t>15/5/23</a:t>
             </a:fld>
             <a:endParaRPr lang="en-SG"/>
           </a:p>
@@ -1458,7 +1460,7 @@
           <a:p>
             <a:fld id="{B660096C-8D26-4D32-9715-ADA6CA82D210}" type="datetimeFigureOut">
               <a:rPr lang="en-SG" smtClean="0"/>
-              <a:t>8/5/23</a:t>
+              <a:t>15/5/23</a:t>
             </a:fld>
             <a:endParaRPr lang="en-SG"/>
           </a:p>
@@ -1873,7 +1875,7 @@
           <a:p>
             <a:fld id="{B660096C-8D26-4D32-9715-ADA6CA82D210}" type="datetimeFigureOut">
               <a:rPr lang="en-SG" smtClean="0"/>
-              <a:t>8/5/23</a:t>
+              <a:t>15/5/23</a:t>
             </a:fld>
             <a:endParaRPr lang="en-SG"/>
           </a:p>
@@ -2015,7 +2017,7 @@
           <a:p>
             <a:fld id="{B660096C-8D26-4D32-9715-ADA6CA82D210}" type="datetimeFigureOut">
               <a:rPr lang="en-SG" smtClean="0"/>
-              <a:t>8/5/23</a:t>
+              <a:t>15/5/23</a:t>
             </a:fld>
             <a:endParaRPr lang="en-SG"/>
           </a:p>
@@ -2128,7 +2130,7 @@
           <a:p>
             <a:fld id="{B660096C-8D26-4D32-9715-ADA6CA82D210}" type="datetimeFigureOut">
               <a:rPr lang="en-SG" smtClean="0"/>
-              <a:t>8/5/23</a:t>
+              <a:t>15/5/23</a:t>
             </a:fld>
             <a:endParaRPr lang="en-SG"/>
           </a:p>
@@ -2441,7 +2443,7 @@
           <a:p>
             <a:fld id="{B660096C-8D26-4D32-9715-ADA6CA82D210}" type="datetimeFigureOut">
               <a:rPr lang="en-SG" smtClean="0"/>
-              <a:t>8/5/23</a:t>
+              <a:t>15/5/23</a:t>
             </a:fld>
             <a:endParaRPr lang="en-SG"/>
           </a:p>
@@ -2730,7 +2732,7 @@
           <a:p>
             <a:fld id="{B660096C-8D26-4D32-9715-ADA6CA82D210}" type="datetimeFigureOut">
               <a:rPr lang="en-SG" smtClean="0"/>
-              <a:t>8/5/23</a:t>
+              <a:t>15/5/23</a:t>
             </a:fld>
             <a:endParaRPr lang="en-SG"/>
           </a:p>
@@ -2973,7 +2975,7 @@
           <a:p>
             <a:fld id="{B660096C-8D26-4D32-9715-ADA6CA82D210}" type="datetimeFigureOut">
               <a:rPr lang="en-SG" smtClean="0"/>
-              <a:t>8/5/23</a:t>
+              <a:t>15/5/23</a:t>
             </a:fld>
             <a:endParaRPr lang="en-SG"/>
           </a:p>
@@ -3887,6 +3889,66 @@
 </p:sld>
 </file>
 
+<file path=ppt/slides/slide13.xml><?xml version="1.0" encoding="utf-8"?>
+<p:sld xmlns:a="http://schemas.openxmlformats.org/drawingml/2006/main" xmlns:r="http://schemas.openxmlformats.org/officeDocument/2006/relationships" xmlns:p="http://schemas.openxmlformats.org/presentationml/2006/main">
+  <p:cSld>
+    <p:spTree>
+      <p:nvGrpSpPr>
+        <p:cNvPr id="1" name=""/>
+        <p:cNvGrpSpPr/>
+        <p:nvPr/>
+      </p:nvGrpSpPr>
+      <p:grpSpPr>
+        <a:xfrm>
+          <a:off x="0" y="0"/>
+          <a:ext cx="0" cy="0"/>
+          <a:chOff x="0" y="0"/>
+          <a:chExt cx="0" cy="0"/>
+        </a:xfrm>
+      </p:grpSpPr>
+      <p:pic>
+        <p:nvPicPr>
+          <p:cNvPr id="4" name="Picture 3">
+            <a:extLst>
+              <a:ext uri="{FF2B5EF4-FFF2-40B4-BE49-F238E27FC236}">
+                <a16:creationId xmlns:a16="http://schemas.microsoft.com/office/drawing/2014/main" id="{FBF14BAD-59E5-333D-5FA9-FEA7648661B6}"/>
+              </a:ext>
+            </a:extLst>
+          </p:cNvPr>
+          <p:cNvPicPr>
+            <a:picLocks noChangeAspect="1"/>
+          </p:cNvPicPr>
+          <p:nvPr/>
+        </p:nvPicPr>
+        <p:blipFill>
+          <a:blip r:embed="rId2"/>
+          <a:stretch>
+            <a:fillRect/>
+          </a:stretch>
+        </p:blipFill>
+        <p:spPr>
+          <a:xfrm>
+            <a:off x="2663788" y="0"/>
+            <a:ext cx="6335033" cy="6858000"/>
+          </a:xfrm>
+          <a:prstGeom prst="rect">
+            <a:avLst/>
+          </a:prstGeom>
+        </p:spPr>
+      </p:pic>
+    </p:spTree>
+    <p:extLst>
+      <p:ext uri="{BB962C8B-B14F-4D97-AF65-F5344CB8AC3E}">
+        <p14:creationId xmlns:p14="http://schemas.microsoft.com/office/powerpoint/2010/main" val="1852300385"/>
+      </p:ext>
+    </p:extLst>
+  </p:cSld>
+  <p:clrMapOvr>
+    <a:masterClrMapping/>
+  </p:clrMapOvr>
+</p:sld>
+</file>
+
 <file path=ppt/slides/slide2.xml><?xml version="1.0" encoding="utf-8"?>
 <p:sld xmlns:a="http://schemas.openxmlformats.org/drawingml/2006/main" xmlns:r="http://schemas.openxmlformats.org/officeDocument/2006/relationships" xmlns:p="http://schemas.openxmlformats.org/presentationml/2006/main">
   <p:cSld>

</xml_diff>